<commit_message>
Update General Fluid Equations.pptx
Found a typo in the Reynold's Transport Theorem
</commit_message>
<xml_diff>
--- a/Posts/2020/General Fluid Equations.pptx
+++ b/Posts/2020/General Fluid Equations.pptx
@@ -8,7 +8,7 @@
     <p:sldId id="256" r:id="rId5"/>
   </p:sldIdLst>
   <p:sldSz cx="12192000" cy="6858000"/>
-  <p:notesSz cx="6858000" cy="9144000"/>
+  <p:notesSz cx="7077075" cy="9363075"/>
   <p:defaultTextStyle>
     <a:defPPr>
       <a:defRPr lang="en-US"/>
@@ -154,10 +154,9 @@
           </a:lstStyle>
           <a:p>
             <a:r>
-              <a:rPr lang="en-US" smtClean="0"/>
+              <a:rPr lang="en-US"/>
               <a:t>Click to edit Master title style</a:t>
             </a:r>
-            <a:endParaRPr lang="en-US"/>
           </a:p>
         </p:txBody>
       </p:sp>
@@ -219,10 +218,9 @@
           </a:lstStyle>
           <a:p>
             <a:r>
-              <a:rPr lang="en-US" smtClean="0"/>
+              <a:rPr lang="en-US"/>
               <a:t>Click to edit Master subtitle style</a:t>
             </a:r>
-            <a:endParaRPr lang="en-US"/>
           </a:p>
         </p:txBody>
       </p:sp>
@@ -243,7 +241,7 @@
           <a:p>
             <a:fld id="{AFCCC995-E95C-4B26-B2F7-C5FA69E16CEE}" type="datetimeFigureOut">
               <a:rPr lang="en-US" smtClean="0"/>
-              <a:t>7/3/2020</a:t>
+              <a:t>7/20/2021</a:t>
             </a:fld>
             <a:endParaRPr lang="en-US"/>
           </a:p>
@@ -337,10 +335,9 @@
           <a:lstStyle/>
           <a:p>
             <a:r>
-              <a:rPr lang="en-US" smtClean="0"/>
+              <a:rPr lang="en-US"/>
               <a:t>Click to edit Master title style</a:t>
             </a:r>
-            <a:endParaRPr lang="en-US"/>
           </a:p>
         </p:txBody>
       </p:sp>
@@ -361,38 +358,37 @@
           <a:p>
             <a:pPr lvl="0"/>
             <a:r>
-              <a:rPr lang="en-US" smtClean="0"/>
+              <a:rPr lang="en-US"/>
               <a:t>Edit Master text styles</a:t>
             </a:r>
           </a:p>
           <a:p>
             <a:pPr lvl="1"/>
             <a:r>
-              <a:rPr lang="en-US" smtClean="0"/>
+              <a:rPr lang="en-US"/>
               <a:t>Second level</a:t>
             </a:r>
           </a:p>
           <a:p>
             <a:pPr lvl="2"/>
             <a:r>
-              <a:rPr lang="en-US" smtClean="0"/>
+              <a:rPr lang="en-US"/>
               <a:t>Third level</a:t>
             </a:r>
           </a:p>
           <a:p>
             <a:pPr lvl="3"/>
             <a:r>
-              <a:rPr lang="en-US" smtClean="0"/>
+              <a:rPr lang="en-US"/>
               <a:t>Fourth level</a:t>
             </a:r>
           </a:p>
           <a:p>
             <a:pPr lvl="4"/>
             <a:r>
-              <a:rPr lang="en-US" smtClean="0"/>
+              <a:rPr lang="en-US"/>
               <a:t>Fifth level</a:t>
             </a:r>
-            <a:endParaRPr lang="en-US"/>
           </a:p>
         </p:txBody>
       </p:sp>
@@ -413,7 +409,7 @@
           <a:p>
             <a:fld id="{AFCCC995-E95C-4B26-B2F7-C5FA69E16CEE}" type="datetimeFigureOut">
               <a:rPr lang="en-US" smtClean="0"/>
-              <a:t>7/3/2020</a:t>
+              <a:t>7/20/2021</a:t>
             </a:fld>
             <a:endParaRPr lang="en-US"/>
           </a:p>
@@ -512,10 +508,9 @@
           <a:lstStyle/>
           <a:p>
             <a:r>
-              <a:rPr lang="en-US" smtClean="0"/>
+              <a:rPr lang="en-US"/>
               <a:t>Click to edit Master title style</a:t>
             </a:r>
-            <a:endParaRPr lang="en-US"/>
           </a:p>
         </p:txBody>
       </p:sp>
@@ -541,38 +536,37 @@
           <a:p>
             <a:pPr lvl="0"/>
             <a:r>
-              <a:rPr lang="en-US" smtClean="0"/>
+              <a:rPr lang="en-US"/>
               <a:t>Edit Master text styles</a:t>
             </a:r>
           </a:p>
           <a:p>
             <a:pPr lvl="1"/>
             <a:r>
-              <a:rPr lang="en-US" smtClean="0"/>
+              <a:rPr lang="en-US"/>
               <a:t>Second level</a:t>
             </a:r>
           </a:p>
           <a:p>
             <a:pPr lvl="2"/>
             <a:r>
-              <a:rPr lang="en-US" smtClean="0"/>
+              <a:rPr lang="en-US"/>
               <a:t>Third level</a:t>
             </a:r>
           </a:p>
           <a:p>
             <a:pPr lvl="3"/>
             <a:r>
-              <a:rPr lang="en-US" smtClean="0"/>
+              <a:rPr lang="en-US"/>
               <a:t>Fourth level</a:t>
             </a:r>
           </a:p>
           <a:p>
             <a:pPr lvl="4"/>
             <a:r>
-              <a:rPr lang="en-US" smtClean="0"/>
+              <a:rPr lang="en-US"/>
               <a:t>Fifth level</a:t>
             </a:r>
-            <a:endParaRPr lang="en-US"/>
           </a:p>
         </p:txBody>
       </p:sp>
@@ -593,7 +587,7 @@
           <a:p>
             <a:fld id="{AFCCC995-E95C-4B26-B2F7-C5FA69E16CEE}" type="datetimeFigureOut">
               <a:rPr lang="en-US" smtClean="0"/>
-              <a:t>7/3/2020</a:t>
+              <a:t>7/20/2021</a:t>
             </a:fld>
             <a:endParaRPr lang="en-US"/>
           </a:p>
@@ -687,10 +681,9 @@
           <a:lstStyle/>
           <a:p>
             <a:r>
-              <a:rPr lang="en-US" smtClean="0"/>
+              <a:rPr lang="en-US"/>
               <a:t>Click to edit Master title style</a:t>
             </a:r>
-            <a:endParaRPr lang="en-US"/>
           </a:p>
         </p:txBody>
       </p:sp>
@@ -711,38 +704,37 @@
           <a:p>
             <a:pPr lvl="0"/>
             <a:r>
-              <a:rPr lang="en-US" smtClean="0"/>
+              <a:rPr lang="en-US"/>
               <a:t>Edit Master text styles</a:t>
             </a:r>
           </a:p>
           <a:p>
             <a:pPr lvl="1"/>
             <a:r>
-              <a:rPr lang="en-US" smtClean="0"/>
+              <a:rPr lang="en-US"/>
               <a:t>Second level</a:t>
             </a:r>
           </a:p>
           <a:p>
             <a:pPr lvl="2"/>
             <a:r>
-              <a:rPr lang="en-US" smtClean="0"/>
+              <a:rPr lang="en-US"/>
               <a:t>Third level</a:t>
             </a:r>
           </a:p>
           <a:p>
             <a:pPr lvl="3"/>
             <a:r>
-              <a:rPr lang="en-US" smtClean="0"/>
+              <a:rPr lang="en-US"/>
               <a:t>Fourth level</a:t>
             </a:r>
           </a:p>
           <a:p>
             <a:pPr lvl="4"/>
             <a:r>
-              <a:rPr lang="en-US" smtClean="0"/>
+              <a:rPr lang="en-US"/>
               <a:t>Fifth level</a:t>
             </a:r>
-            <a:endParaRPr lang="en-US"/>
           </a:p>
         </p:txBody>
       </p:sp>
@@ -763,7 +755,7 @@
           <a:p>
             <a:fld id="{AFCCC995-E95C-4B26-B2F7-C5FA69E16CEE}" type="datetimeFigureOut">
               <a:rPr lang="en-US" smtClean="0"/>
-              <a:t>7/3/2020</a:t>
+              <a:t>7/20/2021</a:t>
             </a:fld>
             <a:endParaRPr lang="en-US"/>
           </a:p>
@@ -866,10 +858,9 @@
           </a:lstStyle>
           <a:p>
             <a:r>
-              <a:rPr lang="en-US" smtClean="0"/>
+              <a:rPr lang="en-US"/>
               <a:t>Click to edit Master title style</a:t>
             </a:r>
-            <a:endParaRPr lang="en-US"/>
           </a:p>
         </p:txBody>
       </p:sp>
@@ -986,7 +977,7 @@
           <a:p>
             <a:pPr lvl="0"/>
             <a:r>
-              <a:rPr lang="en-US" smtClean="0"/>
+              <a:rPr lang="en-US"/>
               <a:t>Edit Master text styles</a:t>
             </a:r>
           </a:p>
@@ -1009,7 +1000,7 @@
           <a:p>
             <a:fld id="{AFCCC995-E95C-4B26-B2F7-C5FA69E16CEE}" type="datetimeFigureOut">
               <a:rPr lang="en-US" smtClean="0"/>
-              <a:t>7/3/2020</a:t>
+              <a:t>7/20/2021</a:t>
             </a:fld>
             <a:endParaRPr lang="en-US"/>
           </a:p>
@@ -1103,10 +1094,9 @@
           <a:lstStyle/>
           <a:p>
             <a:r>
-              <a:rPr lang="en-US" smtClean="0"/>
+              <a:rPr lang="en-US"/>
               <a:t>Click to edit Master title style</a:t>
             </a:r>
-            <a:endParaRPr lang="en-US"/>
           </a:p>
         </p:txBody>
       </p:sp>
@@ -1132,38 +1122,37 @@
           <a:p>
             <a:pPr lvl="0"/>
             <a:r>
-              <a:rPr lang="en-US" smtClean="0"/>
+              <a:rPr lang="en-US"/>
               <a:t>Edit Master text styles</a:t>
             </a:r>
           </a:p>
           <a:p>
             <a:pPr lvl="1"/>
             <a:r>
-              <a:rPr lang="en-US" smtClean="0"/>
+              <a:rPr lang="en-US"/>
               <a:t>Second level</a:t>
             </a:r>
           </a:p>
           <a:p>
             <a:pPr lvl="2"/>
             <a:r>
-              <a:rPr lang="en-US" smtClean="0"/>
+              <a:rPr lang="en-US"/>
               <a:t>Third level</a:t>
             </a:r>
           </a:p>
           <a:p>
             <a:pPr lvl="3"/>
             <a:r>
-              <a:rPr lang="en-US" smtClean="0"/>
+              <a:rPr lang="en-US"/>
               <a:t>Fourth level</a:t>
             </a:r>
           </a:p>
           <a:p>
             <a:pPr lvl="4"/>
             <a:r>
-              <a:rPr lang="en-US" smtClean="0"/>
+              <a:rPr lang="en-US"/>
               <a:t>Fifth level</a:t>
             </a:r>
-            <a:endParaRPr lang="en-US"/>
           </a:p>
         </p:txBody>
       </p:sp>
@@ -1189,38 +1178,37 @@
           <a:p>
             <a:pPr lvl="0"/>
             <a:r>
-              <a:rPr lang="en-US" smtClean="0"/>
+              <a:rPr lang="en-US"/>
               <a:t>Edit Master text styles</a:t>
             </a:r>
           </a:p>
           <a:p>
             <a:pPr lvl="1"/>
             <a:r>
-              <a:rPr lang="en-US" smtClean="0"/>
+              <a:rPr lang="en-US"/>
               <a:t>Second level</a:t>
             </a:r>
           </a:p>
           <a:p>
             <a:pPr lvl="2"/>
             <a:r>
-              <a:rPr lang="en-US" smtClean="0"/>
+              <a:rPr lang="en-US"/>
               <a:t>Third level</a:t>
             </a:r>
           </a:p>
           <a:p>
             <a:pPr lvl="3"/>
             <a:r>
-              <a:rPr lang="en-US" smtClean="0"/>
+              <a:rPr lang="en-US"/>
               <a:t>Fourth level</a:t>
             </a:r>
           </a:p>
           <a:p>
             <a:pPr lvl="4"/>
             <a:r>
-              <a:rPr lang="en-US" smtClean="0"/>
+              <a:rPr lang="en-US"/>
               <a:t>Fifth level</a:t>
             </a:r>
-            <a:endParaRPr lang="en-US"/>
           </a:p>
         </p:txBody>
       </p:sp>
@@ -1241,7 +1229,7 @@
           <a:p>
             <a:fld id="{AFCCC995-E95C-4B26-B2F7-C5FA69E16CEE}" type="datetimeFigureOut">
               <a:rPr lang="en-US" smtClean="0"/>
-              <a:t>7/3/2020</a:t>
+              <a:t>7/20/2021</a:t>
             </a:fld>
             <a:endParaRPr lang="en-US"/>
           </a:p>
@@ -1340,10 +1328,9 @@
           <a:lstStyle/>
           <a:p>
             <a:r>
-              <a:rPr lang="en-US" smtClean="0"/>
+              <a:rPr lang="en-US"/>
               <a:t>Click to edit Master title style</a:t>
             </a:r>
-            <a:endParaRPr lang="en-US"/>
           </a:p>
         </p:txBody>
       </p:sp>
@@ -1406,7 +1393,7 @@
           <a:p>
             <a:pPr lvl="0"/>
             <a:r>
-              <a:rPr lang="en-US" smtClean="0"/>
+              <a:rPr lang="en-US"/>
               <a:t>Edit Master text styles</a:t>
             </a:r>
           </a:p>
@@ -1434,38 +1421,37 @@
           <a:p>
             <a:pPr lvl="0"/>
             <a:r>
-              <a:rPr lang="en-US" smtClean="0"/>
+              <a:rPr lang="en-US"/>
               <a:t>Edit Master text styles</a:t>
             </a:r>
           </a:p>
           <a:p>
             <a:pPr lvl="1"/>
             <a:r>
-              <a:rPr lang="en-US" smtClean="0"/>
+              <a:rPr lang="en-US"/>
               <a:t>Second level</a:t>
             </a:r>
           </a:p>
           <a:p>
             <a:pPr lvl="2"/>
             <a:r>
-              <a:rPr lang="en-US" smtClean="0"/>
+              <a:rPr lang="en-US"/>
               <a:t>Third level</a:t>
             </a:r>
           </a:p>
           <a:p>
             <a:pPr lvl="3"/>
             <a:r>
-              <a:rPr lang="en-US" smtClean="0"/>
+              <a:rPr lang="en-US"/>
               <a:t>Fourth level</a:t>
             </a:r>
           </a:p>
           <a:p>
             <a:pPr lvl="4"/>
             <a:r>
-              <a:rPr lang="en-US" smtClean="0"/>
+              <a:rPr lang="en-US"/>
               <a:t>Fifth level</a:t>
             </a:r>
-            <a:endParaRPr lang="en-US"/>
           </a:p>
         </p:txBody>
       </p:sp>
@@ -1528,7 +1514,7 @@
           <a:p>
             <a:pPr lvl="0"/>
             <a:r>
-              <a:rPr lang="en-US" smtClean="0"/>
+              <a:rPr lang="en-US"/>
               <a:t>Edit Master text styles</a:t>
             </a:r>
           </a:p>
@@ -1556,38 +1542,37 @@
           <a:p>
             <a:pPr lvl="0"/>
             <a:r>
-              <a:rPr lang="en-US" smtClean="0"/>
+              <a:rPr lang="en-US"/>
               <a:t>Edit Master text styles</a:t>
             </a:r>
           </a:p>
           <a:p>
             <a:pPr lvl="1"/>
             <a:r>
-              <a:rPr lang="en-US" smtClean="0"/>
+              <a:rPr lang="en-US"/>
               <a:t>Second level</a:t>
             </a:r>
           </a:p>
           <a:p>
             <a:pPr lvl="2"/>
             <a:r>
-              <a:rPr lang="en-US" smtClean="0"/>
+              <a:rPr lang="en-US"/>
               <a:t>Third level</a:t>
             </a:r>
           </a:p>
           <a:p>
             <a:pPr lvl="3"/>
             <a:r>
-              <a:rPr lang="en-US" smtClean="0"/>
+              <a:rPr lang="en-US"/>
               <a:t>Fourth level</a:t>
             </a:r>
           </a:p>
           <a:p>
             <a:pPr lvl="4"/>
             <a:r>
-              <a:rPr lang="en-US" smtClean="0"/>
+              <a:rPr lang="en-US"/>
               <a:t>Fifth level</a:t>
             </a:r>
-            <a:endParaRPr lang="en-US"/>
           </a:p>
         </p:txBody>
       </p:sp>
@@ -1608,7 +1593,7 @@
           <a:p>
             <a:fld id="{AFCCC995-E95C-4B26-B2F7-C5FA69E16CEE}" type="datetimeFigureOut">
               <a:rPr lang="en-US" smtClean="0"/>
-              <a:t>7/3/2020</a:t>
+              <a:t>7/20/2021</a:t>
             </a:fld>
             <a:endParaRPr lang="en-US"/>
           </a:p>
@@ -1702,10 +1687,9 @@
           <a:lstStyle/>
           <a:p>
             <a:r>
-              <a:rPr lang="en-US" smtClean="0"/>
+              <a:rPr lang="en-US"/>
               <a:t>Click to edit Master title style</a:t>
             </a:r>
-            <a:endParaRPr lang="en-US"/>
           </a:p>
         </p:txBody>
       </p:sp>
@@ -1726,7 +1710,7 @@
           <a:p>
             <a:fld id="{AFCCC995-E95C-4B26-B2F7-C5FA69E16CEE}" type="datetimeFigureOut">
               <a:rPr lang="en-US" smtClean="0"/>
-              <a:t>7/3/2020</a:t>
+              <a:t>7/20/2021</a:t>
             </a:fld>
             <a:endParaRPr lang="en-US"/>
           </a:p>
@@ -1821,7 +1805,7 @@
           <a:p>
             <a:fld id="{AFCCC995-E95C-4B26-B2F7-C5FA69E16CEE}" type="datetimeFigureOut">
               <a:rPr lang="en-US" smtClean="0"/>
-              <a:t>7/3/2020</a:t>
+              <a:t>7/20/2021</a:t>
             </a:fld>
             <a:endParaRPr lang="en-US"/>
           </a:p>
@@ -1924,10 +1908,9 @@
           </a:lstStyle>
           <a:p>
             <a:r>
-              <a:rPr lang="en-US" smtClean="0"/>
+              <a:rPr lang="en-US"/>
               <a:t>Click to edit Master title style</a:t>
             </a:r>
-            <a:endParaRPr lang="en-US"/>
           </a:p>
         </p:txBody>
       </p:sp>
@@ -1981,38 +1964,37 @@
           <a:p>
             <a:pPr lvl="0"/>
             <a:r>
-              <a:rPr lang="en-US" smtClean="0"/>
+              <a:rPr lang="en-US"/>
               <a:t>Edit Master text styles</a:t>
             </a:r>
           </a:p>
           <a:p>
             <a:pPr lvl="1"/>
             <a:r>
-              <a:rPr lang="en-US" smtClean="0"/>
+              <a:rPr lang="en-US"/>
               <a:t>Second level</a:t>
             </a:r>
           </a:p>
           <a:p>
             <a:pPr lvl="2"/>
             <a:r>
-              <a:rPr lang="en-US" smtClean="0"/>
+              <a:rPr lang="en-US"/>
               <a:t>Third level</a:t>
             </a:r>
           </a:p>
           <a:p>
             <a:pPr lvl="3"/>
             <a:r>
-              <a:rPr lang="en-US" smtClean="0"/>
+              <a:rPr lang="en-US"/>
               <a:t>Fourth level</a:t>
             </a:r>
           </a:p>
           <a:p>
             <a:pPr lvl="4"/>
             <a:r>
-              <a:rPr lang="en-US" smtClean="0"/>
+              <a:rPr lang="en-US"/>
               <a:t>Fifth level</a:t>
             </a:r>
-            <a:endParaRPr lang="en-US"/>
           </a:p>
         </p:txBody>
       </p:sp>
@@ -2075,7 +2057,7 @@
           <a:p>
             <a:pPr lvl="0"/>
             <a:r>
-              <a:rPr lang="en-US" smtClean="0"/>
+              <a:rPr lang="en-US"/>
               <a:t>Edit Master text styles</a:t>
             </a:r>
           </a:p>
@@ -2098,7 +2080,7 @@
           <a:p>
             <a:fld id="{AFCCC995-E95C-4B26-B2F7-C5FA69E16CEE}" type="datetimeFigureOut">
               <a:rPr lang="en-US" smtClean="0"/>
-              <a:t>7/3/2020</a:t>
+              <a:t>7/20/2021</a:t>
             </a:fld>
             <a:endParaRPr lang="en-US"/>
           </a:p>
@@ -2201,10 +2183,9 @@
           </a:lstStyle>
           <a:p>
             <a:r>
-              <a:rPr lang="en-US" smtClean="0"/>
+              <a:rPr lang="en-US"/>
               <a:t>Click to edit Master title style</a:t>
             </a:r>
-            <a:endParaRPr lang="en-US"/>
           </a:p>
         </p:txBody>
       </p:sp>
@@ -2328,7 +2309,7 @@
           <a:p>
             <a:pPr lvl="0"/>
             <a:r>
-              <a:rPr lang="en-US" smtClean="0"/>
+              <a:rPr lang="en-US"/>
               <a:t>Edit Master text styles</a:t>
             </a:r>
           </a:p>
@@ -2351,7 +2332,7 @@
           <a:p>
             <a:fld id="{AFCCC995-E95C-4B26-B2F7-C5FA69E16CEE}" type="datetimeFigureOut">
               <a:rPr lang="en-US" smtClean="0"/>
-              <a:t>7/3/2020</a:t>
+              <a:t>7/20/2021</a:t>
             </a:fld>
             <a:endParaRPr lang="en-US"/>
           </a:p>
@@ -2460,10 +2441,9 @@
           <a:lstStyle/>
           <a:p>
             <a:r>
-              <a:rPr lang="en-US" smtClean="0"/>
+              <a:rPr lang="en-US"/>
               <a:t>Click to edit Master title style</a:t>
             </a:r>
-            <a:endParaRPr lang="en-US"/>
           </a:p>
         </p:txBody>
       </p:sp>
@@ -2494,38 +2474,37 @@
           <a:p>
             <a:pPr lvl="0"/>
             <a:r>
-              <a:rPr lang="en-US" smtClean="0"/>
+              <a:rPr lang="en-US"/>
               <a:t>Edit Master text styles</a:t>
             </a:r>
           </a:p>
           <a:p>
             <a:pPr lvl="1"/>
             <a:r>
-              <a:rPr lang="en-US" smtClean="0"/>
+              <a:rPr lang="en-US"/>
               <a:t>Second level</a:t>
             </a:r>
           </a:p>
           <a:p>
             <a:pPr lvl="2"/>
             <a:r>
-              <a:rPr lang="en-US" smtClean="0"/>
+              <a:rPr lang="en-US"/>
               <a:t>Third level</a:t>
             </a:r>
           </a:p>
           <a:p>
             <a:pPr lvl="3"/>
             <a:r>
-              <a:rPr lang="en-US" smtClean="0"/>
+              <a:rPr lang="en-US"/>
               <a:t>Fourth level</a:t>
             </a:r>
           </a:p>
           <a:p>
             <a:pPr lvl="4"/>
             <a:r>
-              <a:rPr lang="en-US" smtClean="0"/>
+              <a:rPr lang="en-US"/>
               <a:t>Fifth level</a:t>
             </a:r>
-            <a:endParaRPr lang="en-US"/>
           </a:p>
         </p:txBody>
       </p:sp>
@@ -2564,7 +2543,7 @@
           <a:p>
             <a:fld id="{AFCCC995-E95C-4B26-B2F7-C5FA69E16CEE}" type="datetimeFigureOut">
               <a:rPr lang="en-US" smtClean="0"/>
-              <a:t>7/3/2020</a:t>
+              <a:t>7/20/2021</a:t>
             </a:fld>
             <a:endParaRPr lang="en-US"/>
           </a:p>
@@ -2969,8 +2948,8 @@
           <a:chExt cx="0" cy="0"/>
         </a:xfrm>
       </p:grpSpPr>
-      <mc:AlternateContent xmlns:mc="http://schemas.openxmlformats.org/markup-compatibility/2006">
-        <mc:Choice xmlns:a14="http://schemas.microsoft.com/office/drawing/2010/main" Requires="a14">
+      <mc:AlternateContent xmlns:mc="http://schemas.openxmlformats.org/markup-compatibility/2006" xmlns:a14="http://schemas.microsoft.com/office/drawing/2010/main">
+        <mc:Choice Requires="a14">
           <p:sp>
             <p:nvSpPr>
               <p:cNvPr id="10" name="TextBox 9"/>
@@ -3102,7 +3081,7 @@
             </p:txBody>
           </p:sp>
         </mc:Choice>
-        <mc:Fallback>
+        <mc:Fallback xmlns="">
           <p:sp>
             <p:nvSpPr>
               <p:cNvPr id="10" name="TextBox 9"/>
@@ -3304,7 +3283,13 @@
                           <a:rPr lang="en-US" sz="1000" b="0" i="1" smtClean="0">
                             <a:latin typeface="Cambria Math" panose="02040503050406030204" pitchFamily="18" charset="0"/>
                           </a:rPr>
-                          <m:t>=0</m:t>
+                          <m:t>=</m:t>
+                        </m:r>
+                        <m:r>
+                          <a:rPr lang="en-US" sz="1000" b="0" i="1" smtClean="0">
+                            <a:latin typeface="Cambria Math" panose="02040503050406030204" pitchFamily="18" charset="0"/>
+                          </a:rPr>
+                          <m:t>0</m:t>
                         </m:r>
                       </m:oMath>
                     </m:oMathPara>
@@ -3365,8 +3350,8 @@
             </p:sp>
           </mc:Fallback>
         </mc:AlternateContent>
-        <mc:AlternateContent xmlns:mc="http://schemas.openxmlformats.org/markup-compatibility/2006">
-          <mc:Choice xmlns:a14="http://schemas.microsoft.com/office/drawing/2010/main" Requires="a14">
+        <mc:AlternateContent xmlns:mc="http://schemas.openxmlformats.org/markup-compatibility/2006" xmlns:a14="http://schemas.microsoft.com/office/drawing/2010/main">
+          <mc:Choice Requires="a14">
             <p:sp>
               <p:nvSpPr>
                 <p:cNvPr id="8" name="TextBox 7"/>
@@ -3567,7 +3552,7 @@
               </p:txBody>
             </p:sp>
           </mc:Choice>
-          <mc:Fallback>
+          <mc:Fallback xmlns="">
             <p:sp>
               <p:nvSpPr>
                 <p:cNvPr id="8" name="TextBox 7"/>
@@ -3618,8 +3603,8 @@
             </p:sp>
           </mc:Fallback>
         </mc:AlternateContent>
-        <mc:AlternateContent xmlns:mc="http://schemas.openxmlformats.org/markup-compatibility/2006">
-          <mc:Choice xmlns:a14="http://schemas.microsoft.com/office/drawing/2010/main" Requires="a14">
+        <mc:AlternateContent xmlns:mc="http://schemas.openxmlformats.org/markup-compatibility/2006" xmlns:a14="http://schemas.microsoft.com/office/drawing/2010/main">
+          <mc:Choice Requires="a14">
             <p:sp>
               <p:nvSpPr>
                 <p:cNvPr id="15" name="TextBox 14"/>
@@ -3987,7 +3972,7 @@
               </p:txBody>
             </p:sp>
           </mc:Choice>
-          <mc:Fallback>
+          <mc:Fallback xmlns="">
             <p:sp>
               <p:nvSpPr>
                 <p:cNvPr id="15" name="TextBox 14"/>
@@ -4155,7 +4140,13 @@
                           <a:rPr lang="en-US" sz="1000" b="0" i="1" smtClean="0">
                             <a:latin typeface="Cambria Math" panose="02040503050406030204" pitchFamily="18" charset="0"/>
                           </a:rPr>
-                          <m:t>=0</m:t>
+                          <m:t>=</m:t>
+                        </m:r>
+                        <m:r>
+                          <a:rPr lang="en-US" sz="1000" b="0" i="1" smtClean="0">
+                            <a:latin typeface="Cambria Math" panose="02040503050406030204" pitchFamily="18" charset="0"/>
+                          </a:rPr>
+                          <m:t>0</m:t>
                         </m:r>
                       </m:oMath>
                     </m:oMathPara>
@@ -4216,8 +4207,8 @@
             </p:sp>
           </mc:Fallback>
         </mc:AlternateContent>
-        <mc:AlternateContent xmlns:mc="http://schemas.openxmlformats.org/markup-compatibility/2006">
-          <mc:Choice xmlns:a14="http://schemas.microsoft.com/office/drawing/2010/main" Requires="a14">
+        <mc:AlternateContent xmlns:mc="http://schemas.openxmlformats.org/markup-compatibility/2006" xmlns:a14="http://schemas.microsoft.com/office/drawing/2010/main">
+          <mc:Choice Requires="a14">
             <p:sp>
               <p:nvSpPr>
                 <p:cNvPr id="9" name="TextBox 8"/>
@@ -4538,7 +4529,7 @@
               </p:txBody>
             </p:sp>
           </mc:Choice>
-          <mc:Fallback>
+          <mc:Fallback xmlns="">
             <p:sp>
               <p:nvSpPr>
                 <p:cNvPr id="9" name="TextBox 8"/>
@@ -4589,8 +4580,8 @@
             </p:sp>
           </mc:Fallback>
         </mc:AlternateContent>
-        <mc:AlternateContent xmlns:mc="http://schemas.openxmlformats.org/markup-compatibility/2006">
-          <mc:Choice xmlns:a14="http://schemas.microsoft.com/office/drawing/2010/main" Requires="a14">
+        <mc:AlternateContent xmlns:mc="http://schemas.openxmlformats.org/markup-compatibility/2006" xmlns:a14="http://schemas.microsoft.com/office/drawing/2010/main">
+          <mc:Choice Requires="a14">
             <p:sp>
               <p:nvSpPr>
                 <p:cNvPr id="16" name="TextBox 15"/>
@@ -5067,7 +5058,7 @@
               </p:txBody>
             </p:sp>
           </mc:Choice>
-          <mc:Fallback>
+          <mc:Fallback xmlns="">
             <p:sp>
               <p:nvSpPr>
                 <p:cNvPr id="16" name="TextBox 15"/>
@@ -5266,7 +5257,13 @@
                           <a:rPr lang="en-US" sz="1000" b="0" i="1" smtClean="0">
                             <a:latin typeface="Cambria Math" panose="02040503050406030204" pitchFamily="18" charset="0"/>
                           </a:rPr>
-                          <m:t>=0</m:t>
+                          <m:t>=</m:t>
+                        </m:r>
+                        <m:r>
+                          <a:rPr lang="en-US" sz="1000" b="0" i="1" smtClean="0">
+                            <a:latin typeface="Cambria Math" panose="02040503050406030204" pitchFamily="18" charset="0"/>
+                          </a:rPr>
+                          <m:t>0</m:t>
                         </m:r>
                       </m:oMath>
                     </m:oMathPara>
@@ -5327,8 +5324,8 @@
             </p:sp>
           </mc:Fallback>
         </mc:AlternateContent>
-        <mc:AlternateContent xmlns:mc="http://schemas.openxmlformats.org/markup-compatibility/2006">
-          <mc:Choice xmlns:a14="http://schemas.microsoft.com/office/drawing/2010/main" Requires="a14">
+        <mc:AlternateContent xmlns:mc="http://schemas.openxmlformats.org/markup-compatibility/2006" xmlns:a14="http://schemas.microsoft.com/office/drawing/2010/main">
+          <mc:Choice Requires="a14">
             <p:sp>
               <p:nvSpPr>
                 <p:cNvPr id="13" name="TextBox 12"/>
@@ -5612,7 +5609,7 @@
               </p:txBody>
             </p:sp>
           </mc:Choice>
-          <mc:Fallback>
+          <mc:Fallback xmlns="">
             <p:sp>
               <p:nvSpPr>
                 <p:cNvPr id="13" name="TextBox 12"/>
@@ -5663,8 +5660,8 @@
             </p:sp>
           </mc:Fallback>
         </mc:AlternateContent>
-        <mc:AlternateContent xmlns:mc="http://schemas.openxmlformats.org/markup-compatibility/2006">
-          <mc:Choice xmlns:a14="http://schemas.microsoft.com/office/drawing/2010/main" Requires="a14">
+        <mc:AlternateContent xmlns:mc="http://schemas.openxmlformats.org/markup-compatibility/2006" xmlns:a14="http://schemas.microsoft.com/office/drawing/2010/main">
+          <mc:Choice Requires="a14">
             <p:sp>
               <p:nvSpPr>
                 <p:cNvPr id="19" name="TextBox 18"/>
@@ -6185,7 +6182,7 @@
               </p:txBody>
             </p:sp>
           </mc:Choice>
-          <mc:Fallback>
+          <mc:Fallback xmlns="">
             <p:sp>
               <p:nvSpPr>
                 <p:cNvPr id="19" name="TextBox 18"/>
@@ -6444,7 +6441,13 @@
                           <a:rPr lang="en-US" sz="1000" b="0" i="0" smtClean="0">
                             <a:latin typeface="Cambria Math" panose="02040503050406030204" pitchFamily="18" charset="0"/>
                           </a:rPr>
-                          <m:t>=0</m:t>
+                          <m:t>=</m:t>
+                        </m:r>
+                        <m:r>
+                          <a:rPr lang="en-US" sz="1000" b="0" i="0" smtClean="0">
+                            <a:latin typeface="Cambria Math" panose="02040503050406030204" pitchFamily="18" charset="0"/>
+                          </a:rPr>
+                          <m:t>0</m:t>
                         </m:r>
                       </m:oMath>
                     </m:oMathPara>
@@ -6505,8 +6508,8 @@
             </p:sp>
           </mc:Fallback>
         </mc:AlternateContent>
-        <mc:AlternateContent xmlns:mc="http://schemas.openxmlformats.org/markup-compatibility/2006">
-          <mc:Choice xmlns:a14="http://schemas.microsoft.com/office/drawing/2010/main" Requires="a14">
+        <mc:AlternateContent xmlns:mc="http://schemas.openxmlformats.org/markup-compatibility/2006" xmlns:a14="http://schemas.microsoft.com/office/drawing/2010/main">
+          <mc:Choice Requires="a14">
             <p:sp>
               <p:nvSpPr>
                 <p:cNvPr id="14" name="TextBox 13"/>
@@ -6946,7 +6949,7 @@
               </p:txBody>
             </p:sp>
           </mc:Choice>
-          <mc:Fallback>
+          <mc:Fallback xmlns="">
             <p:sp>
               <p:nvSpPr>
                 <p:cNvPr id="14" name="TextBox 13"/>
@@ -6997,8 +7000,8 @@
             </p:sp>
           </mc:Fallback>
         </mc:AlternateContent>
-        <mc:AlternateContent xmlns:mc="http://schemas.openxmlformats.org/markup-compatibility/2006">
-          <mc:Choice xmlns:a14="http://schemas.microsoft.com/office/drawing/2010/main" Requires="a14">
+        <mc:AlternateContent xmlns:mc="http://schemas.openxmlformats.org/markup-compatibility/2006" xmlns:a14="http://schemas.microsoft.com/office/drawing/2010/main">
+          <mc:Choice Requires="a14">
             <p:sp>
               <p:nvSpPr>
                 <p:cNvPr id="20" name="TextBox 19"/>
@@ -7649,7 +7652,7 @@
               </p:txBody>
             </p:sp>
           </mc:Choice>
-          <mc:Fallback>
+          <mc:Fallback xmlns="">
             <p:sp>
               <p:nvSpPr>
                 <p:cNvPr id="20" name="TextBox 19"/>
@@ -7723,7 +7726,7 @@
             <a:lstStyle/>
             <a:p>
               <a:r>
-                <a:rPr lang="en-US" dirty="0" smtClean="0"/>
+                <a:rPr lang="en-US" dirty="0"/>
                 <a:t>Continuity</a:t>
               </a:r>
             </a:p>
@@ -7752,7 +7755,7 @@
             <a:lstStyle/>
             <a:p>
               <a:r>
-                <a:rPr lang="en-US" dirty="0" smtClean="0"/>
+                <a:rPr lang="en-US" dirty="0"/>
                 <a:t>Momentum</a:t>
               </a:r>
             </a:p>
@@ -7781,16 +7784,15 @@
             <a:lstStyle/>
             <a:p>
               <a:r>
-                <a:rPr lang="en-US" dirty="0" smtClean="0"/>
+                <a:rPr lang="en-US" dirty="0"/>
                 <a:t>Total Energy</a:t>
               </a:r>
-              <a:endParaRPr lang="en-US" dirty="0" smtClean="0"/>
             </a:p>
           </p:txBody>
         </p:sp>
       </p:grpSp>
-      <mc:AlternateContent xmlns:mc="http://schemas.openxmlformats.org/markup-compatibility/2006">
-        <mc:Choice xmlns:a14="http://schemas.microsoft.com/office/drawing/2010/main" Requires="a14">
+      <mc:AlternateContent xmlns:mc="http://schemas.openxmlformats.org/markup-compatibility/2006" xmlns:a14="http://schemas.microsoft.com/office/drawing/2010/main">
+        <mc:Choice Requires="a14">
           <p:sp>
             <p:nvSpPr>
               <p:cNvPr id="33" name="TextBox 32"/>
@@ -7864,7 +7866,7 @@
                   </m:oMath>
                 </a14:m>
                 <a:r>
-                  <a:rPr lang="en-US" sz="1050" dirty="0" smtClean="0"/>
+                  <a:rPr lang="en-US" sz="1050" dirty="0"/>
                   <a:t> - body accelerations (e.g. gravity or E&amp;M)</a:t>
                 </a:r>
               </a:p>
@@ -7884,7 +7886,7 @@
                   </m:oMath>
                 </a14:m>
                 <a:r>
-                  <a:rPr lang="en-US" sz="1050" dirty="0" smtClean="0"/>
+                  <a:rPr lang="en-US" sz="1050" dirty="0"/>
                   <a:t> – internal energy</a:t>
                 </a:r>
               </a:p>
@@ -7904,7 +7906,7 @@
                   </m:oMath>
                 </a14:m>
                 <a:r>
-                  <a:rPr lang="en-US" sz="1050" dirty="0" smtClean="0"/>
+                  <a:rPr lang="en-US" sz="1050" dirty="0"/>
                   <a:t> – second coefficient of viscosity</a:t>
                 </a:r>
               </a:p>
@@ -7924,7 +7926,7 @@
                   </m:oMath>
                 </a14:m>
                 <a:r>
-                  <a:rPr lang="en-US" sz="1050" dirty="0" smtClean="0"/>
+                  <a:rPr lang="en-US" sz="1050" dirty="0"/>
                   <a:t> – dynamic viscosity</a:t>
                 </a:r>
               </a:p>
@@ -7956,7 +7958,7 @@
                   </m:oMath>
                 </a14:m>
                 <a:r>
-                  <a:rPr lang="en-US" sz="1050" dirty="0" smtClean="0"/>
+                  <a:rPr lang="en-US" sz="1050" dirty="0"/>
                   <a:t> - outward surface normal</a:t>
                 </a:r>
               </a:p>
@@ -7976,7 +7978,7 @@
                   </m:oMath>
                 </a14:m>
                 <a:r>
-                  <a:rPr lang="en-US" sz="1050" dirty="0" smtClean="0"/>
+                  <a:rPr lang="en-US" sz="1050" dirty="0"/>
                   <a:t> – pressure </a:t>
                 </a:r>
               </a:p>
@@ -7996,7 +7998,7 @@
                   </m:oMath>
                 </a14:m>
                 <a:r>
-                  <a:rPr lang="en-US" sz="1050" dirty="0" smtClean="0"/>
+                  <a:rPr lang="en-US" sz="1050" dirty="0"/>
                   <a:t> – volumetric heating</a:t>
                 </a:r>
               </a:p>
@@ -8028,7 +8030,7 @@
                   </m:oMath>
                 </a14:m>
                 <a:r>
-                  <a:rPr lang="en-US" sz="1050" dirty="0" smtClean="0"/>
+                  <a:rPr lang="en-US" sz="1050" dirty="0"/>
                   <a:t> - heat flux</a:t>
                 </a:r>
               </a:p>
@@ -8048,7 +8050,7 @@
                   </m:oMath>
                 </a14:m>
                 <a:r>
-                  <a:rPr lang="en-US" sz="1050" dirty="0" smtClean="0"/>
+                  <a:rPr lang="en-US" sz="1050" dirty="0"/>
                   <a:t> – fluid density</a:t>
                 </a:r>
               </a:p>
@@ -8080,7 +8082,7 @@
                   </m:oMath>
                 </a14:m>
                 <a:r>
-                  <a:rPr lang="en-US" sz="1050" dirty="0" smtClean="0"/>
+                  <a:rPr lang="en-US" sz="1050" dirty="0"/>
                   <a:t> – Cauchy stress tensor</a:t>
                 </a:r>
               </a:p>
@@ -8100,7 +8102,7 @@
                   </m:oMath>
                 </a14:m>
                 <a:r>
-                  <a:rPr lang="en-US" sz="1050" dirty="0" smtClean="0"/>
+                  <a:rPr lang="en-US" sz="1050" dirty="0"/>
                   <a:t> – surface</a:t>
                 </a:r>
               </a:p>
@@ -8132,15 +8134,15 @@
                   </m:oMath>
                 </a14:m>
                 <a:r>
-                  <a:rPr lang="en-US" sz="1050" dirty="0" smtClean="0"/>
+                  <a:rPr lang="en-US" sz="1050" dirty="0"/>
                   <a:t> - </a:t>
                 </a:r>
                 <a:r>
-                  <a:rPr lang="en-US" sz="1050" dirty="0" err="1" smtClean="0"/>
+                  <a:rPr lang="en-US" sz="1050" dirty="0" err="1"/>
                   <a:t>deviatoric</a:t>
                 </a:r>
                 <a:r>
-                  <a:rPr lang="en-US" sz="1050" dirty="0" smtClean="0"/>
+                  <a:rPr lang="en-US" sz="1050" dirty="0"/>
                   <a:t> stress tensor</a:t>
                 </a:r>
               </a:p>
@@ -8150,7 +8152,7 @@
                   <a:buChar char="•"/>
                 </a:pPr>
                 <a:r>
-                  <a:rPr lang="en-US" sz="1050" dirty="0" smtClean="0"/>
+                  <a:rPr lang="en-US" sz="1050" dirty="0"/>
                   <a:t>T - temperature</a:t>
                 </a:r>
               </a:p>
@@ -8170,7 +8172,7 @@
                   </m:oMath>
                 </a14:m>
                 <a:r>
-                  <a:rPr lang="en-US" sz="1050" dirty="0" smtClean="0"/>
+                  <a:rPr lang="en-US" sz="1050" dirty="0"/>
                   <a:t> - volume</a:t>
                 </a:r>
               </a:p>
@@ -8202,15 +8204,14 @@
                   </m:oMath>
                 </a14:m>
                 <a:r>
-                  <a:rPr lang="en-US" sz="1050" dirty="0" smtClean="0"/>
+                  <a:rPr lang="en-US" sz="1050" dirty="0"/>
                   <a:t> - flow velocity</a:t>
                 </a:r>
-                <a:endParaRPr lang="en-US" sz="1050" dirty="0"/>
               </a:p>
             </p:txBody>
           </p:sp>
         </mc:Choice>
-        <mc:Fallback>
+        <mc:Fallback xmlns="">
           <p:sp>
             <p:nvSpPr>
               <p:cNvPr id="33" name="TextBox 32"/>
@@ -8268,8 +8269,8 @@
             <a:chExt cx="6530484" cy="1513602"/>
           </a:xfrm>
         </p:grpSpPr>
-        <mc:AlternateContent xmlns:mc="http://schemas.openxmlformats.org/markup-compatibility/2006">
-          <mc:Choice xmlns:a14="http://schemas.microsoft.com/office/drawing/2010/main" Requires="a14">
+        <mc:AlternateContent xmlns:mc="http://schemas.openxmlformats.org/markup-compatibility/2006" xmlns:a14="http://schemas.microsoft.com/office/drawing/2010/main">
+          <mc:Choice Requires="a14">
             <p:sp>
               <p:nvSpPr>
                 <p:cNvPr id="11" name="TextBox 10"/>
@@ -8557,7 +8558,7 @@
               </p:txBody>
             </p:sp>
           </mc:Choice>
-          <mc:Fallback>
+          <mc:Fallback xmlns="">
             <p:sp>
               <p:nvSpPr>
                 <p:cNvPr id="11" name="TextBox 10"/>
@@ -8608,8 +8609,8 @@
             </p:sp>
           </mc:Fallback>
         </mc:AlternateContent>
-        <mc:AlternateContent xmlns:mc="http://schemas.openxmlformats.org/markup-compatibility/2006">
-          <mc:Choice xmlns:a14="http://schemas.microsoft.com/office/drawing/2010/main" Requires="a14">
+        <mc:AlternateContent xmlns:mc="http://schemas.openxmlformats.org/markup-compatibility/2006" xmlns:a14="http://schemas.microsoft.com/office/drawing/2010/main">
+          <mc:Choice Requires="a14">
             <p:sp>
               <p:nvSpPr>
                 <p:cNvPr id="12" name="TextBox 11"/>
@@ -8707,7 +8708,7 @@
               </p:txBody>
             </p:sp>
           </mc:Choice>
-          <mc:Fallback>
+          <mc:Fallback xmlns="">
             <p:sp>
               <p:nvSpPr>
                 <p:cNvPr id="12" name="TextBox 11"/>
@@ -8758,8 +8759,8 @@
             </p:sp>
           </mc:Fallback>
         </mc:AlternateContent>
-        <mc:AlternateContent xmlns:mc="http://schemas.openxmlformats.org/markup-compatibility/2006">
-          <mc:Choice xmlns:a14="http://schemas.microsoft.com/office/drawing/2010/main" Requires="a14">
+        <mc:AlternateContent xmlns:mc="http://schemas.openxmlformats.org/markup-compatibility/2006" xmlns:a14="http://schemas.microsoft.com/office/drawing/2010/main">
+          <mc:Choice Requires="a14">
             <p:sp>
               <p:nvSpPr>
                 <p:cNvPr id="17" name="TextBox 16"/>
@@ -8852,7 +8853,13 @@
                           <a:rPr lang="en-US" sz="1000" b="0" i="1" smtClean="0">
                             <a:latin typeface="Cambria Math" panose="02040503050406030204" pitchFamily="18" charset="0"/>
                           </a:rPr>
-                          <m:t>=0</m:t>
+                          <m:t>=</m:t>
+                        </m:r>
+                        <m:r>
+                          <a:rPr lang="en-US" sz="1000" b="0" i="1" smtClean="0">
+                            <a:latin typeface="Cambria Math" panose="02040503050406030204" pitchFamily="18" charset="0"/>
+                          </a:rPr>
+                          <m:t>0</m:t>
                         </m:r>
                       </m:oMath>
                     </m:oMathPara>
@@ -8862,7 +8869,7 @@
               </p:txBody>
             </p:sp>
           </mc:Choice>
-          <mc:Fallback>
+          <mc:Fallback xmlns="">
             <p:sp>
               <p:nvSpPr>
                 <p:cNvPr id="17" name="TextBox 16"/>
@@ -8936,10 +8943,9 @@
             <a:lstStyle/>
             <a:p>
               <a:r>
-                <a:rPr lang="en-US" dirty="0" smtClean="0"/>
+                <a:rPr lang="en-US" dirty="0"/>
                 <a:t>Newtonian Fluids</a:t>
               </a:r>
-              <a:endParaRPr lang="en-US" dirty="0"/>
             </a:p>
           </p:txBody>
         </p:sp>
@@ -8966,14 +8972,13 @@
             <a:lstStyle/>
             <a:p>
               <a:r>
-                <a:rPr lang="en-US" dirty="0" err="1" smtClean="0"/>
+                <a:rPr lang="en-US" dirty="0" err="1"/>
                 <a:t>Stokes’s</a:t>
               </a:r>
               <a:r>
-                <a:rPr lang="en-US" dirty="0" smtClean="0"/>
+                <a:rPr lang="en-US" dirty="0"/>
                 <a:t> Hypothesis</a:t>
               </a:r>
-              <a:endParaRPr lang="en-US" dirty="0"/>
             </a:p>
           </p:txBody>
         </p:sp>
@@ -9000,15 +9005,14 @@
             <a:lstStyle/>
             <a:p>
               <a:r>
-                <a:rPr lang="en-US" dirty="0" smtClean="0"/>
+                <a:rPr lang="en-US" dirty="0"/>
                 <a:t>Incompressibility</a:t>
               </a:r>
-              <a:endParaRPr lang="en-US" dirty="0"/>
             </a:p>
           </p:txBody>
         </p:sp>
-        <mc:AlternateContent xmlns:mc="http://schemas.openxmlformats.org/markup-compatibility/2006">
-          <mc:Choice xmlns:a14="http://schemas.microsoft.com/office/drawing/2010/main" Requires="a14">
+        <mc:AlternateContent xmlns:mc="http://schemas.openxmlformats.org/markup-compatibility/2006" xmlns:a14="http://schemas.microsoft.com/office/drawing/2010/main">
+          <mc:Choice Requires="a14">
             <p:sp>
               <p:nvSpPr>
                 <p:cNvPr id="34" name="TextBox 33"/>
@@ -9082,7 +9086,19 @@
                               <a:rPr lang="en-US" sz="1000" b="0" i="1" smtClean="0">
                                 <a:latin typeface="Cambria Math" panose="02040503050406030204" pitchFamily="18" charset="0"/>
                               </a:rPr>
-                              <m:t>𝑡h𝑒𝑟𝑚𝑜</m:t>
+                              <m:t>𝑡</m:t>
+                            </m:r>
+                            <m:r>
+                              <a:rPr lang="en-US" sz="1000" b="0" i="1" smtClean="0">
+                                <a:latin typeface="Cambria Math" panose="02040503050406030204" pitchFamily="18" charset="0"/>
+                              </a:rPr>
+                              <m:t>h</m:t>
+                            </m:r>
+                            <m:r>
+                              <a:rPr lang="en-US" sz="1000" b="0" i="1" smtClean="0">
+                                <a:latin typeface="Cambria Math" panose="02040503050406030204" pitchFamily="18" charset="0"/>
+                              </a:rPr>
+                              <m:t>𝑒𝑟𝑚𝑜</m:t>
                             </m:r>
                           </m:sub>
                         </m:sSub>
@@ -9285,7 +9301,7 @@
               </p:txBody>
             </p:sp>
           </mc:Choice>
-          <mc:Fallback>
+          <mc:Fallback xmlns="">
             <p:sp>
               <p:nvSpPr>
                 <p:cNvPr id="34" name="TextBox 33"/>
@@ -9435,16 +9451,15 @@
           <a:lstStyle/>
           <a:p>
             <a:r>
-              <a:rPr lang="en-US" dirty="0" smtClean="0"/>
+              <a:rPr lang="en-US" dirty="0"/>
               <a:t>Reynold’s </a:t>
             </a:r>
           </a:p>
           <a:p>
             <a:r>
-              <a:rPr lang="en-US" dirty="0" smtClean="0"/>
+              <a:rPr lang="en-US" dirty="0"/>
               <a:t>Transport</a:t>
             </a:r>
-            <a:endParaRPr lang="en-US" dirty="0"/>
           </a:p>
         </p:txBody>
       </p:sp>
@@ -9471,10 +9486,9 @@
           <a:lstStyle/>
           <a:p>
             <a:r>
-              <a:rPr lang="en-US" dirty="0" smtClean="0"/>
+              <a:rPr lang="en-US" dirty="0"/>
               <a:t>Cauchy Stress Tensor</a:t>
             </a:r>
-            <a:endParaRPr lang="en-US" dirty="0"/>
           </a:p>
         </p:txBody>
       </p:sp>
@@ -9488,8 +9502,8 @@
             </p:nvSpPr>
             <p:spPr>
               <a:xfrm>
-                <a:off x="4354105" y="170035"/>
-                <a:ext cx="3425915" cy="449226"/>
+                <a:off x="4152898" y="170035"/>
+                <a:ext cx="3985955" cy="490071"/>
               </a:xfrm>
               <a:prstGeom prst="rect">
                 <a:avLst/>
@@ -9513,7 +9527,7 @@
               </a:effectLst>
             </p:spPr>
             <p:txBody>
-              <a:bodyPr wrap="square" lIns="45720" rIns="45720" rtlCol="0">
+              <a:bodyPr wrap="square" lIns="9144" rIns="9144" rtlCol="0">
                 <a:spAutoFit/>
               </a:bodyPr>
               <a:lstStyle/>
@@ -9656,31 +9670,107 @@
                         </m:sub>
                         <m:sup/>
                         <m:e>
-                          <m:f>
-                            <m:fPr>
+                          <m:d>
+                            <m:dPr>
+                              <m:begChr m:val="["/>
+                              <m:endChr m:val="]"/>
                               <m:ctrlPr>
                                 <a:rPr lang="en-US" sz="1000" b="0" i="1" smtClean="0">
                                   <a:latin typeface="Cambria Math" panose="02040503050406030204" pitchFamily="18" charset="0"/>
                                 </a:rPr>
                               </m:ctrlPr>
-                            </m:fPr>
-                            <m:num>
+                            </m:dPr>
+                            <m:e>
+                              <m:f>
+                                <m:fPr>
+                                  <m:ctrlPr>
+                                    <a:rPr lang="en-US" sz="1000" i="1">
+                                      <a:latin typeface="Cambria Math" panose="02040503050406030204" pitchFamily="18" charset="0"/>
+                                    </a:rPr>
+                                  </m:ctrlPr>
+                                </m:fPr>
+                                <m:num>
+                                  <m:r>
+                                    <a:rPr lang="en-US" sz="1000" i="1">
+                                      <a:latin typeface="Cambria Math" panose="02040503050406030204" pitchFamily="18" charset="0"/>
+                                    </a:rPr>
+                                    <m:t>𝐷𝐹</m:t>
+                                  </m:r>
+                                </m:num>
+                                <m:den>
+                                  <m:r>
+                                    <a:rPr lang="en-US" sz="1000" i="1">
+                                      <a:latin typeface="Cambria Math" panose="02040503050406030204" pitchFamily="18" charset="0"/>
+                                    </a:rPr>
+                                    <m:t>𝐷𝑡</m:t>
+                                  </m:r>
+                                </m:den>
+                              </m:f>
                               <m:r>
-                                <a:rPr lang="en-US" sz="1000" b="0" i="1" smtClean="0">
+                                <a:rPr lang="en-US" sz="1000" i="1">
                                   <a:latin typeface="Cambria Math" panose="02040503050406030204" pitchFamily="18" charset="0"/>
                                 </a:rPr>
-                                <m:t>𝐷𝐹</m:t>
+                                <m:t>+</m:t>
                               </m:r>
-                            </m:num>
-                            <m:den>
                               <m:r>
-                                <a:rPr lang="en-US" sz="1000" b="0" i="1" smtClean="0">
+                                <a:rPr lang="en-US" sz="1000" i="1">
                                   <a:latin typeface="Cambria Math" panose="02040503050406030204" pitchFamily="18" charset="0"/>
                                 </a:rPr>
-                                <m:t>𝐷𝑡</m:t>
+                                <m:t>𝐹</m:t>
                               </m:r>
-                            </m:den>
-                          </m:f>
+                              <m:r>
+                                <a:rPr lang="en-US" sz="1000" i="1">
+                                  <a:latin typeface="Cambria Math" panose="02040503050406030204" pitchFamily="18" charset="0"/>
+                                </a:rPr>
+                                <m:t> </m:t>
+                              </m:r>
+                              <m:acc>
+                                <m:accPr>
+                                  <m:chr m:val="⃗"/>
+                                  <m:ctrlPr>
+                                    <a:rPr lang="en-US" sz="1000" i="1">
+                                      <a:latin typeface="Cambria Math" panose="02040503050406030204" pitchFamily="18" charset="0"/>
+                                    </a:rPr>
+                                  </m:ctrlPr>
+                                </m:accPr>
+                                <m:e>
+                                  <m:r>
+                                    <m:rPr>
+                                      <m:sty m:val="p"/>
+                                    </m:rPr>
+                                    <a:rPr lang="en-US" sz="1000">
+                                      <a:latin typeface="Cambria Math" panose="02040503050406030204" pitchFamily="18" charset="0"/>
+                                    </a:rPr>
+                                    <m:t>∇</m:t>
+                                  </m:r>
+                                </m:e>
+                              </m:acc>
+                              <m:r>
+                                <a:rPr lang="en-US" sz="1000" i="1">
+                                  <a:latin typeface="Cambria Math" panose="02040503050406030204" pitchFamily="18" charset="0"/>
+                                </a:rPr>
+                                <m:t>⋅</m:t>
+                              </m:r>
+                              <m:acc>
+                                <m:accPr>
+                                  <m:chr m:val="⃗"/>
+                                  <m:ctrlPr>
+                                    <a:rPr lang="en-US" sz="1000" i="1">
+                                      <a:latin typeface="Cambria Math" panose="02040503050406030204" pitchFamily="18" charset="0"/>
+                                    </a:rPr>
+                                  </m:ctrlPr>
+                                </m:accPr>
+                                <m:e>
+                                  <m:r>
+                                    <a:rPr lang="en-US" sz="1000" i="1">
+                                      <a:latin typeface="Cambria Math" panose="02040503050406030204" pitchFamily="18" charset="0"/>
+                                    </a:rPr>
+                                    <m:t>𝑉</m:t>
+                                  </m:r>
+                                </m:e>
+                              </m:acc>
+                            </m:e>
+                          </m:d>
                           <m:r>
                             <a:rPr lang="en-US" sz="1000" b="0" i="1" smtClean="0">
                               <a:latin typeface="Cambria Math" panose="02040503050406030204" pitchFamily="18" charset="0"/>
@@ -9800,12 +9890,6 @@
                                 <a:rPr lang="en-US" sz="1000" b="0" i="1" smtClean="0">
                                   <a:latin typeface="Cambria Math" panose="02040503050406030204" pitchFamily="18" charset="0"/>
                                 </a:rPr>
-                                <m:t>𝐹</m:t>
-                              </m:r>
-                              <m:r>
-                                <a:rPr lang="en-US" sz="1000" b="0" i="1" smtClean="0">
-                                  <a:latin typeface="Cambria Math" panose="02040503050406030204" pitchFamily="18" charset="0"/>
-                                </a:rPr>
                                 <m:t> </m:t>
                               </m:r>
                               <m:acc>
@@ -9822,7 +9906,7 @@
                                     <a:rPr lang="en-US" sz="1000" b="0" i="0" smtClean="0">
                                       <a:latin typeface="Cambria Math" panose="02040503050406030204" pitchFamily="18" charset="0"/>
                                     </a:rPr>
-                                    <m:t>∇</m:t>
+                                    <m:t>𝛻</m:t>
                                   </m:r>
                                 </m:e>
                               </m:acc>
@@ -9832,24 +9916,41 @@
                                 </a:rPr>
                                 <m:t>⋅</m:t>
                               </m:r>
-                              <m:acc>
-                                <m:accPr>
-                                  <m:chr m:val="⃗"/>
+                              <m:d>
+                                <m:dPr>
                                   <m:ctrlPr>
                                     <a:rPr lang="en-US" sz="1000" b="0" i="1" smtClean="0">
                                       <a:latin typeface="Cambria Math" panose="02040503050406030204" pitchFamily="18" charset="0"/>
                                     </a:rPr>
                                   </m:ctrlPr>
-                                </m:accPr>
+                                </m:dPr>
                                 <m:e>
                                   <m:r>
                                     <a:rPr lang="en-US" sz="1000" b="0" i="1" smtClean="0">
                                       <a:latin typeface="Cambria Math" panose="02040503050406030204" pitchFamily="18" charset="0"/>
                                     </a:rPr>
-                                    <m:t>𝑉</m:t>
+                                    <m:t>𝐹</m:t>
                                   </m:r>
+                                  <m:acc>
+                                    <m:accPr>
+                                      <m:chr m:val="⃗"/>
+                                      <m:ctrlPr>
+                                        <a:rPr lang="en-US" sz="1000" b="0" i="1" smtClean="0">
+                                          <a:latin typeface="Cambria Math" panose="02040503050406030204" pitchFamily="18" charset="0"/>
+                                        </a:rPr>
+                                      </m:ctrlPr>
+                                    </m:accPr>
+                                    <m:e>
+                                      <m:r>
+                                        <a:rPr lang="en-US" sz="1000" b="0" i="1" smtClean="0">
+                                          <a:latin typeface="Cambria Math" panose="02040503050406030204" pitchFamily="18" charset="0"/>
+                                        </a:rPr>
+                                        <m:t>𝑉</m:t>
+                                      </m:r>
+                                    </m:e>
+                                  </m:acc>
                                 </m:e>
-                              </m:acc>
+                              </m:d>
                             </m:e>
                           </m:d>
                         </m:e>
@@ -9885,8 +9986,8 @@
             </p:nvSpPr>
             <p:spPr>
               <a:xfrm>
-                <a:off x="4354105" y="170035"/>
-                <a:ext cx="3425915" cy="449226"/>
+                <a:off x="4152898" y="170035"/>
+                <a:ext cx="3985955" cy="490071"/>
               </a:xfrm>
               <a:prstGeom prst="rect">
                 <a:avLst/>
@@ -9925,8 +10026,8 @@
           </p:sp>
         </mc:Fallback>
       </mc:AlternateContent>
-      <mc:AlternateContent xmlns:mc="http://schemas.openxmlformats.org/markup-compatibility/2006">
-        <mc:Choice xmlns:a14="http://schemas.microsoft.com/office/drawing/2010/main" Requires="a14">
+      <mc:AlternateContent xmlns:mc="http://schemas.openxmlformats.org/markup-compatibility/2006" xmlns:a14="http://schemas.microsoft.com/office/drawing/2010/main">
+        <mc:Choice Requires="a14">
           <p:sp>
             <p:nvSpPr>
               <p:cNvPr id="41" name="TextBox 40"/>
@@ -9993,7 +10094,13 @@
                             <a:rPr lang="en-US" sz="1000" i="1">
                               <a:latin typeface="Cambria Math" panose="02040503050406030204" pitchFamily="18" charset="0"/>
                             </a:rPr>
-                            <m:t>𝒱ℴ</m:t>
+                            <m:t>𝒱</m:t>
+                          </m:r>
+                          <m:r>
+                            <a:rPr lang="en-US" sz="1000" i="1">
+                              <a:latin typeface="Cambria Math" panose="02040503050406030204" pitchFamily="18" charset="0"/>
+                            </a:rPr>
+                            <m:t>ℴ</m:t>
                           </m:r>
                           <m:r>
                             <a:rPr lang="en-US" sz="1000" i="1">
@@ -10022,7 +10129,13 @@
                             <a:rPr lang="en-US" sz="1000" b="0" i="1" smtClean="0">
                               <a:latin typeface="Cambria Math" panose="02040503050406030204" pitchFamily="18" charset="0"/>
                             </a:rPr>
-                            <m:t>𝒱ℴ</m:t>
+                            <m:t>𝒱</m:t>
+                          </m:r>
+                          <m:r>
+                            <a:rPr lang="en-US" sz="1000" b="0" i="1" smtClean="0">
+                              <a:latin typeface="Cambria Math" panose="02040503050406030204" pitchFamily="18" charset="0"/>
+                            </a:rPr>
+                            <m:t>ℴ</m:t>
                           </m:r>
                           <m:r>
                             <a:rPr lang="en-US" sz="1000" b="0" i="1" smtClean="0">
@@ -10060,7 +10173,7 @@
                             <a:rPr lang="en-US" sz="1000" b="0" i="0" smtClean="0">
                               <a:latin typeface="Cambria Math" panose="02040503050406030204" pitchFamily="18" charset="0"/>
                             </a:rPr>
-                            <m:t>∇</m:t>
+                            <m:t>𝛻</m:t>
                           </m:r>
                         </m:e>
                       </m:acc>
@@ -10096,7 +10209,7 @@
             </p:txBody>
           </p:sp>
         </mc:Choice>
-        <mc:Fallback>
+        <mc:Fallback xmlns="">
           <p:sp>
             <p:nvSpPr>
               <p:cNvPr id="41" name="TextBox 40"/>
@@ -10147,8 +10260,8 @@
           </p:sp>
         </mc:Fallback>
       </mc:AlternateContent>
-      <mc:AlternateContent xmlns:mc="http://schemas.openxmlformats.org/markup-compatibility/2006">
-        <mc:Choice xmlns:a14="http://schemas.microsoft.com/office/drawing/2010/main" Requires="a14">
+      <mc:AlternateContent xmlns:mc="http://schemas.openxmlformats.org/markup-compatibility/2006" xmlns:a14="http://schemas.microsoft.com/office/drawing/2010/main">
+        <mc:Choice Requires="a14">
           <p:sp>
             <p:nvSpPr>
               <p:cNvPr id="42" name="TextBox 41"/>
@@ -10264,7 +10377,7 @@
                             <a:rPr lang="en-US" sz="1000" b="0" i="0" smtClean="0">
                               <a:latin typeface="Cambria Math" panose="02040503050406030204" pitchFamily="18" charset="0"/>
                             </a:rPr>
-                            <m:t>∇</m:t>
+                            <m:t>𝛻</m:t>
                           </m:r>
                         </m:e>
                       </m:acc>
@@ -10300,7 +10413,7 @@
             </p:txBody>
           </p:sp>
         </mc:Choice>
-        <mc:Fallback>
+        <mc:Fallback xmlns="">
           <p:sp>
             <p:nvSpPr>
               <p:cNvPr id="42" name="TextBox 41"/>
@@ -10388,10 +10501,9 @@
           <a:p>
             <a:pPr algn="ctr"/>
             <a:r>
-              <a:rPr lang="en-US" sz="1000" dirty="0" smtClean="0"/>
+              <a:rPr lang="en-US" sz="1000" dirty="0"/>
               <a:t>Lm</a:t>
             </a:r>
-            <a:endParaRPr lang="en-US" sz="1000" dirty="0"/>
           </a:p>
         </p:txBody>
       </p:sp>
@@ -10433,11 +10545,7 @@
             <a:pPr algn="ctr"/>
             <a:r>
               <a:rPr lang="en-US" sz="1000" dirty="0" err="1"/>
-              <a:t>E</a:t>
-            </a:r>
-            <a:r>
-              <a:rPr lang="en-US" sz="1000" dirty="0" err="1" smtClean="0"/>
-              <a:t>m</a:t>
+              <a:t>Em</a:t>
             </a:r>
             <a:endParaRPr lang="en-US" sz="1000" dirty="0"/>
           </a:p>
@@ -10480,10 +10588,9 @@
           <a:p>
             <a:pPr algn="ctr"/>
             <a:r>
-              <a:rPr lang="en-US" sz="1000" dirty="0" smtClean="0"/>
+              <a:rPr lang="en-US" sz="1000" dirty="0"/>
               <a:t>lm</a:t>
             </a:r>
-            <a:endParaRPr lang="en-US" sz="1000" dirty="0"/>
           </a:p>
         </p:txBody>
       </p:sp>
@@ -10524,7 +10631,7 @@
           <a:p>
             <a:pPr algn="ctr"/>
             <a:r>
-              <a:rPr lang="en-US" sz="1000" dirty="0" err="1" smtClean="0"/>
+              <a:rPr lang="en-US" sz="1000" dirty="0" err="1"/>
               <a:t>em</a:t>
             </a:r>
             <a:endParaRPr lang="en-US" sz="1000" dirty="0"/>
@@ -10568,7 +10675,7 @@
           <a:p>
             <a:pPr algn="ctr"/>
             <a:r>
-              <a:rPr lang="en-US" sz="1000" dirty="0" err="1" smtClean="0"/>
+              <a:rPr lang="en-US" sz="1000" dirty="0" err="1"/>
               <a:t>Lc</a:t>
             </a:r>
             <a:endParaRPr lang="en-US" sz="1000" dirty="0"/>
@@ -10612,7 +10719,7 @@
           <a:p>
             <a:pPr algn="ctr"/>
             <a:r>
-              <a:rPr lang="en-US" sz="1000" dirty="0" err="1" smtClean="0"/>
+              <a:rPr lang="en-US" sz="1000" dirty="0" err="1"/>
               <a:t>Ec</a:t>
             </a:r>
             <a:endParaRPr lang="en-US" sz="1000" dirty="0"/>
@@ -10656,7 +10763,7 @@
           <a:p>
             <a:pPr algn="ctr"/>
             <a:r>
-              <a:rPr lang="en-US" sz="1000" dirty="0" err="1" smtClean="0"/>
+              <a:rPr lang="en-US" sz="1000" dirty="0" err="1"/>
               <a:t>lc</a:t>
             </a:r>
             <a:endParaRPr lang="en-US" sz="1000" dirty="0"/>
@@ -10700,7 +10807,7 @@
           <a:p>
             <a:pPr algn="ctr"/>
             <a:r>
-              <a:rPr lang="en-US" sz="1000" dirty="0" err="1" smtClean="0"/>
+              <a:rPr lang="en-US" sz="1000" dirty="0" err="1"/>
               <a:t>ec</a:t>
             </a:r>
             <a:endParaRPr lang="en-US" sz="1000" dirty="0"/>
@@ -10744,10 +10851,9 @@
           <a:p>
             <a:pPr algn="ctr"/>
             <a:r>
-              <a:rPr lang="en-US" sz="1000" dirty="0" smtClean="0"/>
+              <a:rPr lang="en-US" sz="1000" dirty="0"/>
               <a:t>Le</a:t>
             </a:r>
-            <a:endParaRPr lang="en-US" sz="1000" dirty="0"/>
           </a:p>
         </p:txBody>
       </p:sp>
@@ -10788,7 +10894,7 @@
           <a:p>
             <a:pPr algn="ctr"/>
             <a:r>
-              <a:rPr lang="en-US" sz="1000" dirty="0" err="1" smtClean="0"/>
+              <a:rPr lang="en-US" sz="1000" dirty="0" err="1"/>
               <a:t>Ee</a:t>
             </a:r>
             <a:endParaRPr lang="en-US" sz="1000" dirty="0"/>
@@ -10832,10 +10938,9 @@
           <a:p>
             <a:pPr algn="ctr"/>
             <a:r>
-              <a:rPr lang="en-US" sz="1000" dirty="0" smtClean="0"/>
+              <a:rPr lang="en-US" sz="1000" dirty="0"/>
               <a:t>le</a:t>
             </a:r>
-            <a:endParaRPr lang="en-US" sz="1000" dirty="0"/>
           </a:p>
         </p:txBody>
       </p:sp>
@@ -10876,7 +10981,7 @@
           <a:p>
             <a:pPr algn="ctr"/>
             <a:r>
-              <a:rPr lang="en-US" sz="1000" dirty="0" err="1" smtClean="0"/>
+              <a:rPr lang="en-US" sz="1000" dirty="0" err="1"/>
               <a:t>ee</a:t>
             </a:r>
             <a:endParaRPr lang="en-US" sz="1000" dirty="0"/>
@@ -10920,7 +11025,7 @@
           <a:p>
             <a:pPr algn="ctr"/>
             <a:r>
-              <a:rPr lang="en-US" sz="1000" dirty="0" err="1" smtClean="0"/>
+              <a:rPr lang="en-US" sz="1000" dirty="0" err="1"/>
               <a:t>Rv</a:t>
             </a:r>
             <a:endParaRPr lang="en-US" sz="1000" dirty="0"/>
@@ -10964,10 +11069,9 @@
           <a:p>
             <a:pPr algn="ctr"/>
             <a:r>
-              <a:rPr lang="en-US" sz="1000" dirty="0" smtClean="0"/>
+              <a:rPr lang="en-US" sz="1000" dirty="0"/>
               <a:t>RJ</a:t>
             </a:r>
-            <a:endParaRPr lang="en-US" sz="1000" dirty="0"/>
           </a:p>
         </p:txBody>
       </p:sp>
@@ -10979,7 +11083,7 @@
         </p:nvSpPr>
         <p:spPr>
           <a:xfrm>
-            <a:off x="7847508" y="277569"/>
+            <a:off x="8215055" y="284491"/>
             <a:ext cx="243617" cy="243617"/>
           </a:xfrm>
           <a:prstGeom prst="ellipse">
@@ -11008,7 +11112,7 @@
           <a:p>
             <a:pPr algn="ctr"/>
             <a:r>
-              <a:rPr lang="en-US" sz="1000" dirty="0" err="1" smtClean="0"/>
+              <a:rPr lang="en-US" sz="1000" dirty="0" err="1"/>
               <a:t>Rf</a:t>
             </a:r>
             <a:endParaRPr lang="en-US" sz="1000" dirty="0"/>
@@ -11052,10 +11156,9 @@
           <a:p>
             <a:pPr algn="ctr"/>
             <a:r>
-              <a:rPr lang="en-US" sz="1000" dirty="0" smtClean="0"/>
+              <a:rPr lang="en-US" sz="1000" dirty="0"/>
               <a:t>Cs</a:t>
             </a:r>
-            <a:endParaRPr lang="en-US" sz="1000" dirty="0"/>
           </a:p>
         </p:txBody>
       </p:sp>
@@ -11096,10 +11199,9 @@
           <a:p>
             <a:pPr algn="ctr"/>
             <a:r>
-              <a:rPr lang="en-US" sz="1000" dirty="0" smtClean="0"/>
+              <a:rPr lang="en-US" sz="1000" dirty="0"/>
               <a:t>Ns</a:t>
             </a:r>
-            <a:endParaRPr lang="en-US" sz="1000" dirty="0"/>
           </a:p>
         </p:txBody>
       </p:sp>
@@ -11140,7 +11242,7 @@
           <a:p>
             <a:pPr algn="ctr"/>
             <a:r>
-              <a:rPr lang="en-US" sz="1000" dirty="0" err="1" smtClean="0"/>
+              <a:rPr lang="en-US" sz="1000" dirty="0" err="1"/>
               <a:t>Sh</a:t>
             </a:r>
             <a:endParaRPr lang="en-US" sz="1000" dirty="0"/>
@@ -11184,10 +11286,9 @@
           <a:p>
             <a:pPr algn="ctr"/>
             <a:r>
-              <a:rPr lang="en-US" sz="1000" dirty="0" smtClean="0"/>
+              <a:rPr lang="en-US" sz="1000" dirty="0"/>
               <a:t>in</a:t>
             </a:r>
-            <a:endParaRPr lang="en-US" sz="1000" dirty="0"/>
           </a:p>
         </p:txBody>
       </p:sp>
@@ -11228,7 +11329,7 @@
           <a:p>
             <a:pPr algn="ctr"/>
             <a:r>
-              <a:rPr lang="en-US" sz="1000" dirty="0" err="1" smtClean="0"/>
+              <a:rPr lang="en-US" sz="1000" dirty="0" err="1"/>
               <a:t>tp</a:t>
             </a:r>
             <a:endParaRPr lang="en-US" sz="1000" dirty="0"/>
@@ -11263,7 +11364,7 @@
           <a:lstStyle/>
           <a:p>
             <a:r>
-              <a:rPr lang="en-US" sz="1050" dirty="0" smtClean="0"/>
+              <a:rPr lang="en-US" sz="1050" dirty="0"/>
               <a:t>Equation Label Key</a:t>
             </a:r>
           </a:p>
@@ -11273,10 +11374,9 @@
               <a:buChar char="•"/>
             </a:pPr>
             <a:r>
-              <a:rPr lang="en-US" sz="1050" dirty="0" smtClean="0"/>
+              <a:rPr lang="en-US" sz="1050" dirty="0"/>
               <a:t>Fluid equations</a:t>
             </a:r>
-            <a:endParaRPr lang="en-US" sz="1050" dirty="0" smtClean="0"/>
           </a:p>
           <a:p>
             <a:pPr marL="628650" lvl="1" indent="-171450">
@@ -11295,13 +11395,8 @@
             </a:pPr>
             <a:r>
               <a:rPr lang="en-US" sz="1050" dirty="0"/>
-              <a:t>upper case first letter – integral </a:t>
+              <a:t>upper case first letter – integral form</a:t>
             </a:r>
-            <a:r>
-              <a:rPr lang="en-US" sz="1050" dirty="0" smtClean="0"/>
-              <a:t>form</a:t>
-            </a:r>
-            <a:endParaRPr lang="en-US" sz="1050" dirty="0" smtClean="0"/>
           </a:p>
           <a:p>
             <a:pPr marL="628650" lvl="1" indent="-171450">
@@ -11309,15 +11404,15 @@
               <a:buChar char="•"/>
             </a:pPr>
             <a:r>
-              <a:rPr lang="en-US" sz="1050" dirty="0" smtClean="0"/>
+              <a:rPr lang="en-US" sz="1050" dirty="0"/>
               <a:t>first letter ‘l’ or ‘L’ – </a:t>
             </a:r>
             <a:r>
-              <a:rPr lang="en-US" sz="1050" dirty="0" err="1" smtClean="0"/>
+              <a:rPr lang="en-US" sz="1050" dirty="0" err="1"/>
               <a:t>Lagrangian</a:t>
             </a:r>
             <a:r>
-              <a:rPr lang="en-US" sz="1050" dirty="0" smtClean="0"/>
+              <a:rPr lang="en-US" sz="1050" dirty="0"/>
               <a:t> or non-conservation form</a:t>
             </a:r>
           </a:p>
@@ -11327,7 +11422,7 @@
               <a:buChar char="•"/>
             </a:pPr>
             <a:r>
-              <a:rPr lang="en-US" sz="1050" dirty="0" smtClean="0"/>
+              <a:rPr lang="en-US" sz="1050" dirty="0"/>
               <a:t>first letter ‘e’ or ‘E’ – Eulerian or conservation form</a:t>
             </a:r>
           </a:p>
@@ -11337,7 +11432,7 @@
               <a:buChar char="•"/>
             </a:pPr>
             <a:r>
-              <a:rPr lang="en-US" sz="1050" dirty="0" smtClean="0"/>
+              <a:rPr lang="en-US" sz="1050" dirty="0"/>
               <a:t>second letter ‘c’, ‘m’, ‘e’ for continuity, momentum, and energy, respectively</a:t>
             </a:r>
           </a:p>
@@ -11618,6 +11713,15 @@
 </file>
 
 <file path=customXml/item1.xml><?xml version="1.0" encoding="utf-8"?>
+<?mso-contentType ?>
+<FormTemplates xmlns="http://schemas.microsoft.com/sharepoint/v3/contenttype/forms">
+  <Display>DocumentLibraryForm</Display>
+  <Edit>DocumentLibraryForm</Edit>
+  <New>DocumentLibraryForm</New>
+</FormTemplates>
+</file>
+
+<file path=customXml/item2.xml><?xml version="1.0" encoding="utf-8"?>
 <ct:contentTypeSchema xmlns:ct="http://schemas.microsoft.com/office/2006/metadata/contentType" xmlns:ma="http://schemas.microsoft.com/office/2006/metadata/properties/metaAttributes" ct:_="" ma:_="" ma:contentTypeName="Document" ma:contentTypeID="0x0101002BD1E2BB92CBC144967077C2021A537D" ma:contentTypeVersion="7" ma:contentTypeDescription="Create a new document." ma:contentTypeScope="" ma:versionID="13603f4343c62bea59de7b4e78fa22c3">
   <xsd:schema xmlns:xsd="http://www.w3.org/2001/XMLSchema" xmlns:xs="http://www.w3.org/2001/XMLSchema" xmlns:p="http://schemas.microsoft.com/office/2006/metadata/properties" xmlns:ns3="c852713b-0caa-4ac0-ba75-048f00e27b76" targetNamespace="http://schemas.microsoft.com/office/2006/metadata/properties" ma:root="true" ma:fieldsID="1ea06de7f52a3181bb88d059a53cee0e" ns3:_="">
     <xsd:import namespace="c852713b-0caa-4ac0-ba75-048f00e27b76"/>
@@ -11781,15 +11885,6 @@
 </ct:contentTypeSchema>
 </file>
 
-<file path=customXml/item2.xml><?xml version="1.0" encoding="utf-8"?>
-<?mso-contentType ?>
-<FormTemplates xmlns="http://schemas.microsoft.com/sharepoint/v3/contenttype/forms">
-  <Display>DocumentLibraryForm</Display>
-  <Edit>DocumentLibraryForm</Edit>
-  <New>DocumentLibraryForm</New>
-</FormTemplates>
-</file>
-
 <file path=customXml/item3.xml><?xml version="1.0" encoding="utf-8"?>
 <p:properties xmlns:p="http://schemas.microsoft.com/office/2006/metadata/properties" xmlns:xsi="http://www.w3.org/2001/XMLSchema-instance" xmlns:pc="http://schemas.microsoft.com/office/infopath/2007/PartnerControls">
   <documentManagement/>
@@ -11797,6 +11892,14 @@
 </file>
 
 <file path=customXml/itemProps1.xml><?xml version="1.0" encoding="utf-8"?>
+<ds:datastoreItem xmlns:ds="http://schemas.openxmlformats.org/officeDocument/2006/customXml" ds:itemID="{BBD920D1-BFF1-4FCD-A4C4-BA088C4DCACC}">
+  <ds:schemaRefs>
+    <ds:schemaRef ds:uri="http://schemas.microsoft.com/sharepoint/v3/contenttype/forms"/>
+  </ds:schemaRefs>
+</ds:datastoreItem>
+</file>
+
+<file path=customXml/itemProps2.xml><?xml version="1.0" encoding="utf-8"?>
 <ds:datastoreItem xmlns:ds="http://schemas.openxmlformats.org/officeDocument/2006/customXml" ds:itemID="{46BE4778-09D1-4881-9FBE-4AA86546682C}">
   <ds:schemaRefs>
     <ds:schemaRef ds:uri="http://schemas.microsoft.com/office/2006/metadata/contentType"/>
@@ -11814,26 +11917,18 @@
 </ds:datastoreItem>
 </file>
 
-<file path=customXml/itemProps2.xml><?xml version="1.0" encoding="utf-8"?>
-<ds:datastoreItem xmlns:ds="http://schemas.openxmlformats.org/officeDocument/2006/customXml" ds:itemID="{BBD920D1-BFF1-4FCD-A4C4-BA088C4DCACC}">
-  <ds:schemaRefs>
-    <ds:schemaRef ds:uri="http://schemas.microsoft.com/sharepoint/v3/contenttype/forms"/>
-  </ds:schemaRefs>
-</ds:datastoreItem>
-</file>
-
 <file path=customXml/itemProps3.xml><?xml version="1.0" encoding="utf-8"?>
 <ds:datastoreItem xmlns:ds="http://schemas.openxmlformats.org/officeDocument/2006/customXml" ds:itemID="{27DAE9A5-048B-402C-BCE3-7BD115F2E3A2}">
   <ds:schemaRefs>
-    <ds:schemaRef ds:uri="http://schemas.microsoft.com/office/2006/documentManagement/types"/>
-    <ds:schemaRef ds:uri="http://purl.org/dc/elements/1.1/"/>
     <ds:schemaRef ds:uri="http://schemas.microsoft.com/office/2006/metadata/properties"/>
-    <ds:schemaRef ds:uri="c852713b-0caa-4ac0-ba75-048f00e27b76"/>
-    <ds:schemaRef ds:uri="http://purl.org/dc/terms/"/>
     <ds:schemaRef ds:uri="http://schemas.openxmlformats.org/package/2006/metadata/core-properties"/>
     <ds:schemaRef ds:uri="http://purl.org/dc/dcmitype/"/>
     <ds:schemaRef ds:uri="http://schemas.microsoft.com/office/infopath/2007/PartnerControls"/>
+    <ds:schemaRef ds:uri="c852713b-0caa-4ac0-ba75-048f00e27b76"/>
+    <ds:schemaRef ds:uri="http://purl.org/dc/elements/1.1/"/>
     <ds:schemaRef ds:uri="http://www.w3.org/XML/1998/namespace"/>
+    <ds:schemaRef ds:uri="http://schemas.microsoft.com/office/2006/documentManagement/types"/>
+    <ds:schemaRef ds:uri="http://purl.org/dc/terms/"/>
   </ds:schemaRefs>
 </ds:datastoreItem>
 </file>
</xml_diff>

<commit_message>
Fingers crossed, this is the first update with some new files, renamed files, and a new, uniform directory structure to clean up the Blog Wyrm mess.
</commit_message>
<xml_diff>
--- a/Posts/2020/General Fluid Equations.pptx
+++ b/Posts/2020/General Fluid Equations.pptx
@@ -241,7 +241,7 @@
           <a:p>
             <a:fld id="{AFCCC995-E95C-4B26-B2F7-C5FA69E16CEE}" type="datetimeFigureOut">
               <a:rPr lang="en-US" smtClean="0"/>
-              <a:t>10/2/2023</a:t>
+              <a:t>9/24/2025</a:t>
             </a:fld>
             <a:endParaRPr lang="en-US"/>
           </a:p>
@@ -409,7 +409,7 @@
           <a:p>
             <a:fld id="{AFCCC995-E95C-4B26-B2F7-C5FA69E16CEE}" type="datetimeFigureOut">
               <a:rPr lang="en-US" smtClean="0"/>
-              <a:t>10/2/2023</a:t>
+              <a:t>9/24/2025</a:t>
             </a:fld>
             <a:endParaRPr lang="en-US"/>
           </a:p>
@@ -587,7 +587,7 @@
           <a:p>
             <a:fld id="{AFCCC995-E95C-4B26-B2F7-C5FA69E16CEE}" type="datetimeFigureOut">
               <a:rPr lang="en-US" smtClean="0"/>
-              <a:t>10/2/2023</a:t>
+              <a:t>9/24/2025</a:t>
             </a:fld>
             <a:endParaRPr lang="en-US"/>
           </a:p>
@@ -755,7 +755,7 @@
           <a:p>
             <a:fld id="{AFCCC995-E95C-4B26-B2F7-C5FA69E16CEE}" type="datetimeFigureOut">
               <a:rPr lang="en-US" smtClean="0"/>
-              <a:t>10/2/2023</a:t>
+              <a:t>9/24/2025</a:t>
             </a:fld>
             <a:endParaRPr lang="en-US"/>
           </a:p>
@@ -1000,7 +1000,7 @@
           <a:p>
             <a:fld id="{AFCCC995-E95C-4B26-B2F7-C5FA69E16CEE}" type="datetimeFigureOut">
               <a:rPr lang="en-US" smtClean="0"/>
-              <a:t>10/2/2023</a:t>
+              <a:t>9/24/2025</a:t>
             </a:fld>
             <a:endParaRPr lang="en-US"/>
           </a:p>
@@ -1229,7 +1229,7 @@
           <a:p>
             <a:fld id="{AFCCC995-E95C-4B26-B2F7-C5FA69E16CEE}" type="datetimeFigureOut">
               <a:rPr lang="en-US" smtClean="0"/>
-              <a:t>10/2/2023</a:t>
+              <a:t>9/24/2025</a:t>
             </a:fld>
             <a:endParaRPr lang="en-US"/>
           </a:p>
@@ -1593,7 +1593,7 @@
           <a:p>
             <a:fld id="{AFCCC995-E95C-4B26-B2F7-C5FA69E16CEE}" type="datetimeFigureOut">
               <a:rPr lang="en-US" smtClean="0"/>
-              <a:t>10/2/2023</a:t>
+              <a:t>9/24/2025</a:t>
             </a:fld>
             <a:endParaRPr lang="en-US"/>
           </a:p>
@@ -1710,7 +1710,7 @@
           <a:p>
             <a:fld id="{AFCCC995-E95C-4B26-B2F7-C5FA69E16CEE}" type="datetimeFigureOut">
               <a:rPr lang="en-US" smtClean="0"/>
-              <a:t>10/2/2023</a:t>
+              <a:t>9/24/2025</a:t>
             </a:fld>
             <a:endParaRPr lang="en-US"/>
           </a:p>
@@ -1805,7 +1805,7 @@
           <a:p>
             <a:fld id="{AFCCC995-E95C-4B26-B2F7-C5FA69E16CEE}" type="datetimeFigureOut">
               <a:rPr lang="en-US" smtClean="0"/>
-              <a:t>10/2/2023</a:t>
+              <a:t>9/24/2025</a:t>
             </a:fld>
             <a:endParaRPr lang="en-US"/>
           </a:p>
@@ -2080,7 +2080,7 @@
           <a:p>
             <a:fld id="{AFCCC995-E95C-4B26-B2F7-C5FA69E16CEE}" type="datetimeFigureOut">
               <a:rPr lang="en-US" smtClean="0"/>
-              <a:t>10/2/2023</a:t>
+              <a:t>9/24/2025</a:t>
             </a:fld>
             <a:endParaRPr lang="en-US"/>
           </a:p>
@@ -2332,7 +2332,7 @@
           <a:p>
             <a:fld id="{AFCCC995-E95C-4B26-B2F7-C5FA69E16CEE}" type="datetimeFigureOut">
               <a:rPr lang="en-US" smtClean="0"/>
-              <a:t>10/2/2023</a:t>
+              <a:t>9/24/2025</a:t>
             </a:fld>
             <a:endParaRPr lang="en-US"/>
           </a:p>
@@ -2543,7 +2543,7 @@
           <a:p>
             <a:fld id="{AFCCC995-E95C-4B26-B2F7-C5FA69E16CEE}" type="datetimeFigureOut">
               <a:rPr lang="en-US" smtClean="0"/>
-              <a:t>10/2/2023</a:t>
+              <a:t>9/24/2025</a:t>
             </a:fld>
             <a:endParaRPr lang="en-US"/>
           </a:p>
@@ -5285,9 +5285,9 @@
         <p:grpSpPr>
           <a:xfrm>
             <a:off x="5609519" y="3780061"/>
-            <a:ext cx="6530484" cy="2191182"/>
+            <a:ext cx="6417360" cy="2191182"/>
             <a:chOff x="5609519" y="3780061"/>
-            <a:chExt cx="6530484" cy="2191182"/>
+            <a:chExt cx="6417360" cy="2191182"/>
           </a:xfrm>
         </p:grpSpPr>
         <mc:AlternateContent xmlns:mc="http://schemas.openxmlformats.org/markup-compatibility/2006" xmlns:a14="http://schemas.microsoft.com/office/drawing/2010/main">
@@ -6026,8 +6026,8 @@
             </a:p>
           </p:txBody>
         </p:sp>
-        <mc:AlternateContent xmlns:mc="http://schemas.openxmlformats.org/markup-compatibility/2006" xmlns:a14="http://schemas.microsoft.com/office/drawing/2010/main">
-          <mc:Choice Requires="a14">
+        <mc:AlternateContent xmlns:mc="http://schemas.openxmlformats.org/markup-compatibility/2006">
+          <mc:Choice xmlns:a14="http://schemas.microsoft.com/office/drawing/2010/main" Requires="a14">
             <p:sp>
               <p:nvSpPr>
                 <p:cNvPr id="34" name="TextBox 33"/>
@@ -6036,7 +6036,7 @@
               </p:nvSpPr>
               <p:spPr>
                 <a:xfrm>
-                  <a:off x="9524083" y="4340060"/>
+                  <a:off x="9410959" y="4377768"/>
                   <a:ext cx="2615920" cy="438133"/>
                 </a:xfrm>
                 <a:prstGeom prst="rect">
@@ -6304,7 +6304,7 @@
               </p:txBody>
             </p:sp>
           </mc:Choice>
-          <mc:Fallback xmlns="">
+          <mc:Fallback>
             <p:sp>
               <p:nvSpPr>
                 <p:cNvPr id="34" name="TextBox 33"/>
@@ -6315,7 +6315,7 @@
               </p:nvSpPr>
               <p:spPr>
                 <a:xfrm>
-                  <a:off x="9524083" y="4340060"/>
+                  <a:off x="9410959" y="4377768"/>
                   <a:ext cx="2615920" cy="438133"/>
                 </a:xfrm>
                 <a:prstGeom prst="rect">
@@ -6368,7 +6368,7 @@
           <p:spPr>
             <a:xfrm>
               <a:off x="9448196" y="4118852"/>
-              <a:ext cx="1383847" cy="221208"/>
+              <a:ext cx="1270723" cy="258916"/>
             </a:xfrm>
             <a:prstGeom prst="bentConnector2">
               <a:avLst/>
@@ -6403,13 +6403,13 @@
           </p:nvCxnSpPr>
           <p:spPr>
             <a:xfrm rot="5400000" flipH="1">
-              <a:off x="9486962" y="3433113"/>
-              <a:ext cx="86267" cy="2603895"/>
+              <a:off x="9411546" y="3508529"/>
+              <a:ext cx="123975" cy="2490771"/>
             </a:xfrm>
             <a:prstGeom prst="bentConnector4">
               <a:avLst>
-                <a:gd name="adj1" fmla="val -264991"/>
-                <a:gd name="adj2" fmla="val 75115"/>
+                <a:gd name="adj1" fmla="val -184392"/>
+                <a:gd name="adj2" fmla="val 76256"/>
               </a:avLst>
             </a:prstGeom>
             <a:ln>
@@ -6911,9 +6911,9 @@
         <p:grpSpPr>
           <a:xfrm>
             <a:off x="545051" y="869986"/>
-            <a:ext cx="11618808" cy="2745967"/>
+            <a:ext cx="11423617" cy="2745967"/>
             <a:chOff x="545051" y="869986"/>
-            <a:chExt cx="11618808" cy="2745967"/>
+            <a:chExt cx="11423617" cy="2745967"/>
           </a:xfrm>
         </p:grpSpPr>
         <p:grpSp>
@@ -11602,7 +11602,7 @@
           </p:nvSpPr>
           <p:spPr>
             <a:xfrm>
-              <a:off x="11920242" y="3249690"/>
+              <a:off x="11725050" y="3055754"/>
               <a:ext cx="243617" cy="243617"/>
             </a:xfrm>
             <a:prstGeom prst="ellipse">
@@ -12402,9 +12402,12 @@
 </file>
 
 <file path=customXml/item1.xml><?xml version="1.0" encoding="utf-8"?>
-<p:properties xmlns:p="http://schemas.microsoft.com/office/2006/metadata/properties" xmlns:xsi="http://www.w3.org/2001/XMLSchema-instance" xmlns:pc="http://schemas.microsoft.com/office/infopath/2007/PartnerControls">
-  <documentManagement/>
-</p:properties>
+<?mso-contentType ?>
+<FormTemplates xmlns="http://schemas.microsoft.com/sharepoint/v3/contenttype/forms">
+  <Display>DocumentLibraryForm</Display>
+  <Edit>DocumentLibraryForm</Edit>
+  <New>DocumentLibraryForm</New>
+</FormTemplates>
 </file>
 
 <file path=customXml/item2.xml><?xml version="1.0" encoding="utf-8"?>
@@ -12572,26 +12575,15 @@
 </file>
 
 <file path=customXml/item3.xml><?xml version="1.0" encoding="utf-8"?>
-<?mso-contentType ?>
-<FormTemplates xmlns="http://schemas.microsoft.com/sharepoint/v3/contenttype/forms">
-  <Display>DocumentLibraryForm</Display>
-  <Edit>DocumentLibraryForm</Edit>
-  <New>DocumentLibraryForm</New>
-</FormTemplates>
+<p:properties xmlns:p="http://schemas.microsoft.com/office/2006/metadata/properties" xmlns:xsi="http://www.w3.org/2001/XMLSchema-instance" xmlns:pc="http://schemas.microsoft.com/office/infopath/2007/PartnerControls">
+  <documentManagement/>
+</p:properties>
 </file>
 
 <file path=customXml/itemProps1.xml><?xml version="1.0" encoding="utf-8"?>
-<ds:datastoreItem xmlns:ds="http://schemas.openxmlformats.org/officeDocument/2006/customXml" ds:itemID="{27DAE9A5-048B-402C-BCE3-7BD115F2E3A2}">
+<ds:datastoreItem xmlns:ds="http://schemas.openxmlformats.org/officeDocument/2006/customXml" ds:itemID="{BBD920D1-BFF1-4FCD-A4C4-BA088C4DCACC}">
   <ds:schemaRefs>
-    <ds:schemaRef ds:uri="http://schemas.microsoft.com/office/2006/metadata/properties"/>
-    <ds:schemaRef ds:uri="http://schemas.openxmlformats.org/package/2006/metadata/core-properties"/>
-    <ds:schemaRef ds:uri="http://purl.org/dc/dcmitype/"/>
-    <ds:schemaRef ds:uri="http://schemas.microsoft.com/office/infopath/2007/PartnerControls"/>
-    <ds:schemaRef ds:uri="c852713b-0caa-4ac0-ba75-048f00e27b76"/>
-    <ds:schemaRef ds:uri="http://purl.org/dc/elements/1.1/"/>
-    <ds:schemaRef ds:uri="http://www.w3.org/XML/1998/namespace"/>
-    <ds:schemaRef ds:uri="http://schemas.microsoft.com/office/2006/documentManagement/types"/>
-    <ds:schemaRef ds:uri="http://purl.org/dc/terms/"/>
+    <ds:schemaRef ds:uri="http://schemas.microsoft.com/sharepoint/v3/contenttype/forms"/>
   </ds:schemaRefs>
 </ds:datastoreItem>
 </file>
@@ -12615,9 +12607,17 @@
 </file>
 
 <file path=customXml/itemProps3.xml><?xml version="1.0" encoding="utf-8"?>
-<ds:datastoreItem xmlns:ds="http://schemas.openxmlformats.org/officeDocument/2006/customXml" ds:itemID="{BBD920D1-BFF1-4FCD-A4C4-BA088C4DCACC}">
+<ds:datastoreItem xmlns:ds="http://schemas.openxmlformats.org/officeDocument/2006/customXml" ds:itemID="{27DAE9A5-048B-402C-BCE3-7BD115F2E3A2}">
   <ds:schemaRefs>
-    <ds:schemaRef ds:uri="http://schemas.microsoft.com/sharepoint/v3/contenttype/forms"/>
+    <ds:schemaRef ds:uri="http://schemas.microsoft.com/office/2006/metadata/properties"/>
+    <ds:schemaRef ds:uri="http://schemas.openxmlformats.org/package/2006/metadata/core-properties"/>
+    <ds:schemaRef ds:uri="http://purl.org/dc/dcmitype/"/>
+    <ds:schemaRef ds:uri="http://schemas.microsoft.com/office/infopath/2007/PartnerControls"/>
+    <ds:schemaRef ds:uri="c852713b-0caa-4ac0-ba75-048f00e27b76"/>
+    <ds:schemaRef ds:uri="http://purl.org/dc/elements/1.1/"/>
+    <ds:schemaRef ds:uri="http://www.w3.org/XML/1998/namespace"/>
+    <ds:schemaRef ds:uri="http://schemas.microsoft.com/office/2006/documentManagement/types"/>
+    <ds:schemaRef ds:uri="http://purl.org/dc/terms/"/>
   </ds:schemaRefs>
 </ds:datastoreItem>
 </file>
</xml_diff>